<commit_message>
Fig 7 structures SMILES added
</commit_message>
<xml_diff>
--- a/pres/Scaffold analytics figures to modify with chemical structures.pptx
+++ b/pres/Scaffold analytics figures to modify with chemical structures.pptx
@@ -11,6 +11,7 @@
     <p:sldId id="259" r:id="rId5"/>
     <p:sldId id="260" r:id="rId6"/>
     <p:sldId id="261" r:id="rId7"/>
+    <p:sldId id="262" r:id="rId8"/>
   </p:sldIdLst>
   <p:sldSz cx="12192000" cy="6858000"/>
   <p:notesSz cx="6858000" cy="9144000"/>
@@ -109,6 +110,11 @@
       </a:defRPr>
     </a:lvl9pPr>
   </p:defaultTextStyle>
+  <p:extLst>
+    <p:ext uri="{EFAFB233-063F-42B5-8137-9DF3F51BA10A}">
+      <p15:sldGuideLst xmlns:p15="http://schemas.microsoft.com/office/powerpoint/2012/main"/>
+    </p:ext>
+  </p:extLst>
 </p:presentation>
 </file>
 
@@ -259,7 +265,7 @@
           <a:p>
             <a:fld id="{CC6D5F6E-A517-4011-9B2A-55B5C277BA86}" type="datetimeFigureOut">
               <a:rPr lang="en-US" smtClean="0"/>
-              <a:t>6/17/2019</a:t>
+              <a:t>6/22/2019</a:t>
             </a:fld>
             <a:endParaRPr lang="en-US"/>
           </a:p>
@@ -457,7 +463,7 @@
           <a:p>
             <a:fld id="{CC6D5F6E-A517-4011-9B2A-55B5C277BA86}" type="datetimeFigureOut">
               <a:rPr lang="en-US" smtClean="0"/>
-              <a:t>6/17/2019</a:t>
+              <a:t>6/22/2019</a:t>
             </a:fld>
             <a:endParaRPr lang="en-US"/>
           </a:p>
@@ -665,7 +671,7 @@
           <a:p>
             <a:fld id="{CC6D5F6E-A517-4011-9B2A-55B5C277BA86}" type="datetimeFigureOut">
               <a:rPr lang="en-US" smtClean="0"/>
-              <a:t>6/17/2019</a:t>
+              <a:t>6/22/2019</a:t>
             </a:fld>
             <a:endParaRPr lang="en-US"/>
           </a:p>
@@ -863,7 +869,7 @@
           <a:p>
             <a:fld id="{CC6D5F6E-A517-4011-9B2A-55B5C277BA86}" type="datetimeFigureOut">
               <a:rPr lang="en-US" smtClean="0"/>
-              <a:t>6/17/2019</a:t>
+              <a:t>6/22/2019</a:t>
             </a:fld>
             <a:endParaRPr lang="en-US"/>
           </a:p>
@@ -1138,7 +1144,7 @@
           <a:p>
             <a:fld id="{CC6D5F6E-A517-4011-9B2A-55B5C277BA86}" type="datetimeFigureOut">
               <a:rPr lang="en-US" smtClean="0"/>
-              <a:t>6/17/2019</a:t>
+              <a:t>6/22/2019</a:t>
             </a:fld>
             <a:endParaRPr lang="en-US"/>
           </a:p>
@@ -1403,7 +1409,7 @@
           <a:p>
             <a:fld id="{CC6D5F6E-A517-4011-9B2A-55B5C277BA86}" type="datetimeFigureOut">
               <a:rPr lang="en-US" smtClean="0"/>
-              <a:t>6/17/2019</a:t>
+              <a:t>6/22/2019</a:t>
             </a:fld>
             <a:endParaRPr lang="en-US"/>
           </a:p>
@@ -1815,7 +1821,7 @@
           <a:p>
             <a:fld id="{CC6D5F6E-A517-4011-9B2A-55B5C277BA86}" type="datetimeFigureOut">
               <a:rPr lang="en-US" smtClean="0"/>
-              <a:t>6/17/2019</a:t>
+              <a:t>6/22/2019</a:t>
             </a:fld>
             <a:endParaRPr lang="en-US"/>
           </a:p>
@@ -1956,7 +1962,7 @@
           <a:p>
             <a:fld id="{CC6D5F6E-A517-4011-9B2A-55B5C277BA86}" type="datetimeFigureOut">
               <a:rPr lang="en-US" smtClean="0"/>
-              <a:t>6/17/2019</a:t>
+              <a:t>6/22/2019</a:t>
             </a:fld>
             <a:endParaRPr lang="en-US"/>
           </a:p>
@@ -2069,7 +2075,7 @@
           <a:p>
             <a:fld id="{CC6D5F6E-A517-4011-9B2A-55B5C277BA86}" type="datetimeFigureOut">
               <a:rPr lang="en-US" smtClean="0"/>
-              <a:t>6/17/2019</a:t>
+              <a:t>6/22/2019</a:t>
             </a:fld>
             <a:endParaRPr lang="en-US"/>
           </a:p>
@@ -2380,7 +2386,7 @@
           <a:p>
             <a:fld id="{CC6D5F6E-A517-4011-9B2A-55B5C277BA86}" type="datetimeFigureOut">
               <a:rPr lang="en-US" smtClean="0"/>
-              <a:t>6/17/2019</a:t>
+              <a:t>6/22/2019</a:t>
             </a:fld>
             <a:endParaRPr lang="en-US"/>
           </a:p>
@@ -2668,7 +2674,7 @@
           <a:p>
             <a:fld id="{CC6D5F6E-A517-4011-9B2A-55B5C277BA86}" type="datetimeFigureOut">
               <a:rPr lang="en-US" smtClean="0"/>
-              <a:t>6/17/2019</a:t>
+              <a:t>6/22/2019</a:t>
             </a:fld>
             <a:endParaRPr lang="en-US"/>
           </a:p>
@@ -2909,7 +2915,7 @@
           <a:p>
             <a:fld id="{CC6D5F6E-A517-4011-9B2A-55B5C277BA86}" type="datetimeFigureOut">
               <a:rPr lang="en-US" smtClean="0"/>
-              <a:t>6/17/2019</a:t>
+              <a:t>6/22/2019</a:t>
             </a:fld>
             <a:endParaRPr lang="en-US"/>
           </a:p>
@@ -4003,6 +4009,208 @@
 </p:sld>
 </file>
 
+<file path=ppt/slides/slide7.xml><?xml version="1.0" encoding="utf-8"?>
+<p:sld xmlns:a="http://schemas.openxmlformats.org/drawingml/2006/main" xmlns:r="http://schemas.openxmlformats.org/officeDocument/2006/relationships" xmlns:p="http://schemas.openxmlformats.org/presentationml/2006/main">
+  <p:cSld>
+    <p:spTree>
+      <p:nvGrpSpPr>
+        <p:cNvPr id="1" name=""/>
+        <p:cNvGrpSpPr/>
+        <p:nvPr/>
+      </p:nvGrpSpPr>
+      <p:grpSpPr>
+        <a:xfrm>
+          <a:off x="0" y="0"/>
+          <a:ext cx="0" cy="0"/>
+          <a:chOff x="0" y="0"/>
+          <a:chExt cx="0" cy="0"/>
+        </a:xfrm>
+      </p:grpSpPr>
+      <p:sp>
+        <p:nvSpPr>
+          <p:cNvPr id="2" name="Title 1">
+            <a:extLst>
+              <a:ext uri="{FF2B5EF4-FFF2-40B4-BE49-F238E27FC236}">
+                <a16:creationId xmlns:a16="http://schemas.microsoft.com/office/drawing/2014/main" id="{F088470F-5011-4439-AB7C-1E79595CDB65}"/>
+              </a:ext>
+            </a:extLst>
+          </p:cNvPr>
+          <p:cNvSpPr>
+            <a:spLocks noGrp="1"/>
+          </p:cNvSpPr>
+          <p:nvPr>
+            <p:ph type="title"/>
+          </p:nvPr>
+        </p:nvSpPr>
+        <p:spPr>
+          <a:xfrm>
+            <a:off x="838200" y="365125"/>
+            <a:ext cx="5057775" cy="758825"/>
+          </a:xfrm>
+        </p:spPr>
+        <p:txBody>
+          <a:bodyPr/>
+          <a:lstStyle/>
+          <a:p>
+            <a:r>
+              <a:rPr lang="en-US" dirty="0"/>
+              <a:t>Fig 7</a:t>
+            </a:r>
+          </a:p>
+        </p:txBody>
+      </p:sp>
+      <p:pic>
+        <p:nvPicPr>
+          <p:cNvPr id="5" name="Content Placeholder 4" descr="A close up of a map&#10;&#10;Description generated with very high confidence">
+            <a:extLst>
+              <a:ext uri="{FF2B5EF4-FFF2-40B4-BE49-F238E27FC236}">
+                <a16:creationId xmlns:a16="http://schemas.microsoft.com/office/drawing/2014/main" id="{5AF8A700-B548-4DB4-B632-B17BD18FC31B}"/>
+              </a:ext>
+            </a:extLst>
+          </p:cNvPr>
+          <p:cNvPicPr>
+            <a:picLocks noGrp="1" noChangeAspect="1"/>
+          </p:cNvPicPr>
+          <p:nvPr>
+            <p:ph idx="1"/>
+          </p:nvPr>
+        </p:nvPicPr>
+        <p:blipFill>
+          <a:blip r:embed="rId2">
+            <a:extLst>
+              <a:ext uri="{28A0092B-C50C-407E-A947-70E740481C1C}">
+                <a14:useLocalDpi xmlns:a14="http://schemas.microsoft.com/office/drawing/2010/main" val="0"/>
+              </a:ext>
+            </a:extLst>
+          </a:blip>
+          <a:stretch>
+            <a:fillRect/>
+          </a:stretch>
+        </p:blipFill>
+        <p:spPr>
+          <a:xfrm>
+            <a:off x="2241725" y="1825625"/>
+            <a:ext cx="7708550" cy="4351338"/>
+          </a:xfrm>
+        </p:spPr>
+      </p:pic>
+      <p:sp>
+        <p:nvSpPr>
+          <p:cNvPr id="6" name="Rectangle 5">
+            <a:extLst>
+              <a:ext uri="{FF2B5EF4-FFF2-40B4-BE49-F238E27FC236}">
+                <a16:creationId xmlns:a16="http://schemas.microsoft.com/office/drawing/2014/main" id="{E4138C2B-015E-4A2D-ABC1-F237DE9C17B1}"/>
+              </a:ext>
+            </a:extLst>
+          </p:cNvPr>
+          <p:cNvSpPr/>
+          <p:nvPr/>
+        </p:nvSpPr>
+        <p:spPr>
+          <a:xfrm>
+            <a:off x="3590924" y="1825625"/>
+            <a:ext cx="1019175" cy="1079500"/>
+          </a:xfrm>
+          <a:prstGeom prst="rect">
+            <a:avLst/>
+          </a:prstGeom>
+          <a:solidFill>
+            <a:schemeClr val="bg1"/>
+          </a:solidFill>
+          <a:ln>
+            <a:noFill/>
+          </a:ln>
+        </p:spPr>
+        <p:style>
+          <a:lnRef idx="2">
+            <a:schemeClr val="accent1">
+              <a:shade val="50000"/>
+            </a:schemeClr>
+          </a:lnRef>
+          <a:fillRef idx="1">
+            <a:schemeClr val="accent1"/>
+          </a:fillRef>
+          <a:effectRef idx="0">
+            <a:schemeClr val="accent1"/>
+          </a:effectRef>
+          <a:fontRef idx="minor">
+            <a:schemeClr val="lt1"/>
+          </a:fontRef>
+        </p:style>
+        <p:txBody>
+          <a:bodyPr rtlCol="0" anchor="ctr"/>
+          <a:lstStyle/>
+          <a:p>
+            <a:pPr algn="ctr"/>
+            <a:endParaRPr lang="en-US"/>
+          </a:p>
+        </p:txBody>
+      </p:sp>
+      <p:sp>
+        <p:nvSpPr>
+          <p:cNvPr id="7" name="Rectangle 6">
+            <a:extLst>
+              <a:ext uri="{FF2B5EF4-FFF2-40B4-BE49-F238E27FC236}">
+                <a16:creationId xmlns:a16="http://schemas.microsoft.com/office/drawing/2014/main" id="{442D3EB5-A3B3-4259-A837-4D497C129F93}"/>
+              </a:ext>
+            </a:extLst>
+          </p:cNvPr>
+          <p:cNvSpPr/>
+          <p:nvPr/>
+        </p:nvSpPr>
+        <p:spPr>
+          <a:xfrm>
+            <a:off x="7581903" y="1825625"/>
+            <a:ext cx="1428747" cy="1079500"/>
+          </a:xfrm>
+          <a:prstGeom prst="rect">
+            <a:avLst/>
+          </a:prstGeom>
+          <a:solidFill>
+            <a:schemeClr val="bg1"/>
+          </a:solidFill>
+          <a:ln>
+            <a:noFill/>
+          </a:ln>
+        </p:spPr>
+        <p:style>
+          <a:lnRef idx="2">
+            <a:schemeClr val="accent1">
+              <a:shade val="50000"/>
+            </a:schemeClr>
+          </a:lnRef>
+          <a:fillRef idx="1">
+            <a:schemeClr val="accent1"/>
+          </a:fillRef>
+          <a:effectRef idx="0">
+            <a:schemeClr val="accent1"/>
+          </a:effectRef>
+          <a:fontRef idx="minor">
+            <a:schemeClr val="lt1"/>
+          </a:fontRef>
+        </p:style>
+        <p:txBody>
+          <a:bodyPr rtlCol="0" anchor="ctr"/>
+          <a:lstStyle/>
+          <a:p>
+            <a:pPr algn="ctr"/>
+            <a:endParaRPr lang="en-US"/>
+          </a:p>
+        </p:txBody>
+      </p:sp>
+    </p:spTree>
+    <p:extLst>
+      <p:ext uri="{BB962C8B-B14F-4D97-AF65-F5344CB8AC3E}">
+        <p14:creationId xmlns:p14="http://schemas.microsoft.com/office/powerpoint/2010/main" val="3605801443"/>
+      </p:ext>
+    </p:extLst>
+  </p:cSld>
+  <p:clrMapOvr>
+    <a:masterClrMapping/>
+  </p:clrMapOvr>
+</p:sld>
+</file>
+
 <file path=ppt/theme/theme1.xml><?xml version="1.0" encoding="utf-8"?>
 <a:theme xmlns:a="http://schemas.openxmlformats.org/drawingml/2006/main" name="Office Theme">
   <a:themeElements>

</xml_diff>

<commit_message>
All figs in main paper upgraded
</commit_message>
<xml_diff>
--- a/pres/Scaffold analytics figures to modify with chemical structures.pptx
+++ b/pres/Scaffold analytics figures to modify with chemical structures.pptx
@@ -10963,8 +10963,8 @@
         </p:blipFill>
         <p:spPr>
           <a:xfrm>
-            <a:off x="3416410" y="1914382"/>
-            <a:ext cx="5359179" cy="4807093"/>
+            <a:off x="3256149" y="443784"/>
+            <a:ext cx="6792794" cy="6093030"/>
           </a:xfrm>
           <a:prstGeom prst="rect">
             <a:avLst/>
@@ -10983,8 +10983,8 @@
         </p:nvSpPr>
         <p:spPr>
           <a:xfrm>
-            <a:off x="701560" y="509942"/>
-            <a:ext cx="7805099" cy="338554"/>
+            <a:off x="-117357" y="16474"/>
+            <a:ext cx="1655109" cy="427310"/>
           </a:xfrm>
         </p:spPr>
         <p:txBody>
@@ -10997,43 +10997,6 @@
               <a:rPr lang="en-US" dirty="0"/>
               <a:t>Fig 10a</a:t>
             </a:r>
-          </a:p>
-        </p:txBody>
-      </p:sp>
-      <p:sp>
-        <p:nvSpPr>
-          <p:cNvPr id="5" name="Slide Number Placeholder 4"/>
-          <p:cNvSpPr>
-            <a:spLocks noGrp="1"/>
-          </p:cNvSpPr>
-          <p:nvPr>
-            <p:ph type="sldNum" sz="quarter" idx="17"/>
-          </p:nvPr>
-        </p:nvSpPr>
-        <p:spPr>
-          <a:xfrm>
-            <a:off x="8610600" y="6356350"/>
-            <a:ext cx="2743200" cy="365125"/>
-          </a:xfrm>
-        </p:spPr>
-        <p:txBody>
-          <a:bodyPr/>
-          <a:lstStyle/>
-          <a:p>
-            <a:fld id="{0A838F34-1B32-4019-A24D-EF473E6901BC}" type="slidenum">
-              <a:rPr lang="en-US" smtClean="0">
-                <a:solidFill>
-                  <a:srgbClr val="9A8B7D"/>
-                </a:solidFill>
-              </a:rPr>
-              <a:pPr/>
-              <a:t>16</a:t>
-            </a:fld>
-            <a:endParaRPr lang="en-US">
-              <a:solidFill>
-                <a:srgbClr val="9A8B7D"/>
-              </a:solidFill>
-            </a:endParaRPr>
           </a:p>
         </p:txBody>
       </p:sp>
@@ -11052,18 +11015,16 @@
           <p:nvPr/>
         </p:nvCxnSpPr>
         <p:spPr>
-          <a:xfrm flipV="1">
-            <a:off x="4272566" y="2107373"/>
-            <a:ext cx="1143703" cy="2"/>
+          <a:xfrm>
+            <a:off x="4326903" y="650449"/>
+            <a:ext cx="2370756" cy="0"/>
           </a:xfrm>
           <a:prstGeom prst="line">
             <a:avLst/>
           </a:prstGeom>
           <a:ln>
             <a:solidFill>
-              <a:schemeClr val="tx1">
-                <a:lumMod val="50000"/>
-              </a:schemeClr>
+              <a:srgbClr val="FF9966"/>
             </a:solidFill>
           </a:ln>
         </p:spPr>
@@ -11103,8 +11064,8 @@
         </p:blipFill>
         <p:spPr>
           <a:xfrm>
-            <a:off x="2849284" y="3100772"/>
-            <a:ext cx="408101" cy="652959"/>
+            <a:off x="2546570" y="1544120"/>
+            <a:ext cx="531424" cy="850275"/>
           </a:xfrm>
           <a:prstGeom prst="rect">
             <a:avLst/>
@@ -11127,8 +11088,8 @@
         </p:nvCxnSpPr>
         <p:spPr>
           <a:xfrm>
-            <a:off x="3416410" y="5882254"/>
-            <a:ext cx="681229" cy="89453"/>
+            <a:off x="3199593" y="5571241"/>
+            <a:ext cx="901067" cy="1"/>
           </a:xfrm>
           <a:prstGeom prst="line">
             <a:avLst/>
@@ -11167,22 +11128,21 @@
           </p:cNvPr>
           <p:cNvCxnSpPr>
             <a:cxnSpLocks/>
+            <a:endCxn id="6" idx="2"/>
           </p:cNvCxnSpPr>
           <p:nvPr/>
         </p:nvCxnSpPr>
         <p:spPr>
-          <a:xfrm>
-            <a:off x="8402220" y="5479911"/>
-            <a:ext cx="104439" cy="346503"/>
+          <a:xfrm flipV="1">
+            <a:off x="9710775" y="5286243"/>
+            <a:ext cx="592932" cy="118438"/>
           </a:xfrm>
           <a:prstGeom prst="line">
             <a:avLst/>
           </a:prstGeom>
           <a:ln>
             <a:solidFill>
-              <a:schemeClr val="tx1">
-                <a:lumMod val="50000"/>
-              </a:schemeClr>
+              <a:srgbClr val="7030A0"/>
             </a:solidFill>
           </a:ln>
         </p:spPr>
@@ -11222,7 +11182,7 @@
         </p:blipFill>
         <p:spPr>
           <a:xfrm>
-            <a:off x="6502576" y="1902114"/>
+            <a:off x="8675633" y="447294"/>
             <a:ext cx="2253404" cy="2248773"/>
           </a:xfrm>
           <a:prstGeom prst="rect">
@@ -11249,8 +11209,8 @@
         </p:nvSpPr>
         <p:spPr>
           <a:xfrm>
-            <a:off x="2410552" y="4249586"/>
-            <a:ext cx="1005858" cy="1632668"/>
+            <a:off x="1882009" y="2696067"/>
+            <a:ext cx="1317583" cy="3186188"/>
           </a:xfrm>
           <a:prstGeom prst="rect">
             <a:avLst/>
@@ -11290,110 +11250,6 @@
           </a:p>
         </p:txBody>
       </p:sp>
-      <p:sp>
-        <p:nvSpPr>
-          <p:cNvPr id="14" name="Rectangle 13">
-            <a:extLst>
-              <a:ext uri="{FF2B5EF4-FFF2-40B4-BE49-F238E27FC236}">
-                <a16:creationId xmlns:a16="http://schemas.microsoft.com/office/drawing/2014/main" id="{7B2FD56F-9E26-472D-B86E-505BF2457B92}"/>
-              </a:ext>
-            </a:extLst>
-          </p:cNvPr>
-          <p:cNvSpPr/>
-          <p:nvPr/>
-        </p:nvSpPr>
-        <p:spPr>
-          <a:xfrm>
-            <a:off x="5410927" y="1782611"/>
-            <a:ext cx="1005858" cy="1390650"/>
-          </a:xfrm>
-          <a:prstGeom prst="rect">
-            <a:avLst/>
-          </a:prstGeom>
-          <a:noFill/>
-          <a:ln>
-            <a:solidFill>
-              <a:srgbClr val="FFC000"/>
-            </a:solidFill>
-          </a:ln>
-        </p:spPr>
-        <p:style>
-          <a:lnRef idx="2">
-            <a:schemeClr val="accent1">
-              <a:shade val="50000"/>
-            </a:schemeClr>
-          </a:lnRef>
-          <a:fillRef idx="1">
-            <a:schemeClr val="accent1"/>
-          </a:fillRef>
-          <a:effectRef idx="0">
-            <a:schemeClr val="accent1"/>
-          </a:effectRef>
-          <a:fontRef idx="minor">
-            <a:schemeClr val="lt1"/>
-          </a:fontRef>
-        </p:style>
-        <p:txBody>
-          <a:bodyPr rtlCol="0" anchor="ctr"/>
-          <a:lstStyle/>
-          <a:p>
-            <a:pPr algn="ctr"/>
-            <a:endParaRPr lang="en-US"/>
-          </a:p>
-        </p:txBody>
-      </p:sp>
-      <p:sp>
-        <p:nvSpPr>
-          <p:cNvPr id="15" name="Rectangle 14">
-            <a:extLst>
-              <a:ext uri="{FF2B5EF4-FFF2-40B4-BE49-F238E27FC236}">
-                <a16:creationId xmlns:a16="http://schemas.microsoft.com/office/drawing/2014/main" id="{66D6801A-032D-44DE-BBA2-B28C5438E27C}"/>
-              </a:ext>
-            </a:extLst>
-          </p:cNvPr>
-          <p:cNvSpPr/>
-          <p:nvPr/>
-        </p:nvSpPr>
-        <p:spPr>
-          <a:xfrm>
-            <a:off x="7725502" y="4182911"/>
-            <a:ext cx="1005858" cy="1297000"/>
-          </a:xfrm>
-          <a:prstGeom prst="rect">
-            <a:avLst/>
-          </a:prstGeom>
-          <a:noFill/>
-          <a:ln>
-            <a:solidFill>
-              <a:srgbClr val="7030A0"/>
-            </a:solidFill>
-          </a:ln>
-        </p:spPr>
-        <p:style>
-          <a:lnRef idx="2">
-            <a:schemeClr val="accent1">
-              <a:shade val="50000"/>
-            </a:schemeClr>
-          </a:lnRef>
-          <a:fillRef idx="1">
-            <a:schemeClr val="accent1"/>
-          </a:fillRef>
-          <a:effectRef idx="0">
-            <a:schemeClr val="accent1"/>
-          </a:effectRef>
-          <a:fontRef idx="minor">
-            <a:schemeClr val="lt1"/>
-          </a:fontRef>
-        </p:style>
-        <p:txBody>
-          <a:bodyPr rtlCol="0" anchor="ctr"/>
-          <a:lstStyle/>
-          <a:p>
-            <a:pPr algn="ctr"/>
-            <a:endParaRPr lang="en-US"/>
-          </a:p>
-        </p:txBody>
-      </p:sp>
       <p:pic>
         <p:nvPicPr>
           <p:cNvPr id="4" name="Picture 3">
@@ -11408,16 +11264,15 @@
           </p:cNvPicPr>
           <p:nvPr/>
         </p:nvPicPr>
-        <p:blipFill>
+        <p:blipFill rotWithShape="1">
           <a:blip r:embed="rId6"/>
-          <a:stretch>
-            <a:fillRect/>
-          </a:stretch>
+          <a:srcRect l="6074" r="7297"/>
+          <a:stretch/>
         </p:blipFill>
         <p:spPr>
           <a:xfrm>
-            <a:off x="417085" y="2995749"/>
-            <a:ext cx="1655108" cy="3725726"/>
+            <a:off x="1951298" y="2797555"/>
+            <a:ext cx="1183258" cy="3074670"/>
           </a:xfrm>
           <a:prstGeom prst="rect">
             <a:avLst/>
@@ -11446,12 +11301,17 @@
         </p:blipFill>
         <p:spPr>
           <a:xfrm>
-            <a:off x="10361221" y="3427251"/>
-            <a:ext cx="1474458" cy="3073269"/>
+            <a:off x="9710775" y="2814505"/>
+            <a:ext cx="1185863" cy="2471738"/>
           </a:xfrm>
           <a:prstGeom prst="rect">
             <a:avLst/>
           </a:prstGeom>
+          <a:ln w="12700">
+            <a:solidFill>
+              <a:srgbClr val="7030A0"/>
+            </a:solidFill>
+          </a:ln>
         </p:spPr>
       </p:pic>
       <p:pic>
@@ -11476,12 +11336,17 @@
         </p:blipFill>
         <p:spPr>
           <a:xfrm>
-            <a:off x="8833935" y="78777"/>
-            <a:ext cx="1866146" cy="3569429"/>
+            <a:off x="6697659" y="456786"/>
+            <a:ext cx="1466850" cy="2805684"/>
           </a:xfrm>
           <a:prstGeom prst="rect">
             <a:avLst/>
           </a:prstGeom>
+          <a:ln w="12700">
+            <a:solidFill>
+              <a:srgbClr val="FF9966"/>
+            </a:solidFill>
+          </a:ln>
         </p:spPr>
       </p:pic>
     </p:spTree>
@@ -11527,8 +11392,8 @@
         </p:nvSpPr>
         <p:spPr>
           <a:xfrm>
-            <a:off x="121381" y="259216"/>
-            <a:ext cx="7805099" cy="338554"/>
+            <a:off x="9946759" y="309639"/>
+            <a:ext cx="1741550" cy="338554"/>
           </a:xfrm>
         </p:spPr>
         <p:txBody>
@@ -11642,8 +11507,8 @@
         </p:blipFill>
         <p:spPr>
           <a:xfrm>
-            <a:off x="487357" y="2906505"/>
-            <a:ext cx="408101" cy="652959"/>
+            <a:off x="487350" y="2906504"/>
+            <a:ext cx="476790" cy="762727"/>
           </a:xfrm>
           <a:prstGeom prst="rect">
             <a:avLst/>
@@ -11716,81 +11581,12 @@
         </p:blipFill>
         <p:spPr>
           <a:xfrm>
-            <a:off x="1004189" y="1700117"/>
-            <a:ext cx="4838392" cy="4817414"/>
+            <a:off x="1004185" y="295518"/>
+            <a:ext cx="6302359" cy="6275070"/>
           </a:xfrm>
           <a:prstGeom prst="rect">
             <a:avLst/>
           </a:prstGeom>
-        </p:spPr>
-      </p:pic>
-      <p:pic>
-        <p:nvPicPr>
-          <p:cNvPr id="6" name="Picture 5">
-            <a:extLst>
-              <a:ext uri="{FF2B5EF4-FFF2-40B4-BE49-F238E27FC236}">
-                <a16:creationId xmlns:a16="http://schemas.microsoft.com/office/drawing/2014/main" id="{D67B6504-7FA2-47EE-9CAB-7D0861AA2E08}"/>
-              </a:ext>
-            </a:extLst>
-          </p:cNvPr>
-          <p:cNvPicPr>
-            <a:picLocks noChangeAspect="1"/>
-          </p:cNvPicPr>
-          <p:nvPr/>
-        </p:nvPicPr>
-        <p:blipFill>
-          <a:blip r:embed="rId5"/>
-          <a:stretch>
-            <a:fillRect/>
-          </a:stretch>
-        </p:blipFill>
-        <p:spPr>
-          <a:xfrm>
-            <a:off x="2378115" y="2031315"/>
-            <a:ext cx="3289541" cy="818906"/>
-          </a:xfrm>
-          <a:prstGeom prst="rect">
-            <a:avLst/>
-          </a:prstGeom>
-          <a:ln>
-            <a:solidFill>
-              <a:srgbClr val="7030A0"/>
-            </a:solidFill>
-          </a:ln>
-        </p:spPr>
-      </p:pic>
-      <p:pic>
-        <p:nvPicPr>
-          <p:cNvPr id="8" name="Picture 7">
-            <a:extLst>
-              <a:ext uri="{FF2B5EF4-FFF2-40B4-BE49-F238E27FC236}">
-                <a16:creationId xmlns:a16="http://schemas.microsoft.com/office/drawing/2014/main" id="{2CD9FC39-6AF5-47F1-9766-23D3CA40AF69}"/>
-              </a:ext>
-            </a:extLst>
-          </p:cNvPr>
-          <p:cNvPicPr>
-            <a:picLocks noChangeAspect="1"/>
-          </p:cNvPicPr>
-          <p:nvPr/>
-        </p:nvPicPr>
-        <p:blipFill rotWithShape="1">
-          <a:blip r:embed="rId6"/>
-          <a:srcRect t="14375"/>
-          <a:stretch/>
-        </p:blipFill>
-        <p:spPr>
-          <a:xfrm>
-            <a:off x="2150483" y="3067668"/>
-            <a:ext cx="1841120" cy="627485"/>
-          </a:xfrm>
-          <a:prstGeom prst="rect">
-            <a:avLst/>
-          </a:prstGeom>
-          <a:ln>
-            <a:solidFill>
-              <a:srgbClr val="FFC000"/>
-            </a:solidFill>
-          </a:ln>
         </p:spPr>
       </p:pic>
       <p:cxnSp>
@@ -11804,22 +11600,21 @@
           </p:cNvPr>
           <p:cNvCxnSpPr>
             <a:cxnSpLocks/>
+            <a:endCxn id="3" idx="1"/>
           </p:cNvCxnSpPr>
           <p:nvPr/>
         </p:nvCxnSpPr>
         <p:spPr>
           <a:xfrm>
-            <a:off x="1862931" y="2016473"/>
-            <a:ext cx="287553" cy="1051195"/>
+            <a:off x="2078410" y="744718"/>
+            <a:ext cx="644349" cy="1565410"/>
           </a:xfrm>
           <a:prstGeom prst="line">
             <a:avLst/>
           </a:prstGeom>
           <a:ln>
             <a:solidFill>
-              <a:schemeClr val="tx1">
-                <a:lumMod val="50000"/>
-              </a:schemeClr>
+              <a:srgbClr val="FF9966"/>
             </a:solidFill>
           </a:ln>
         </p:spPr>
@@ -11854,17 +11649,15 @@
         </p:nvCxnSpPr>
         <p:spPr>
           <a:xfrm>
-            <a:off x="5607994" y="2850222"/>
-            <a:ext cx="0" cy="2781925"/>
+            <a:off x="6909847" y="1674115"/>
+            <a:ext cx="0" cy="3784780"/>
           </a:xfrm>
           <a:prstGeom prst="line">
             <a:avLst/>
           </a:prstGeom>
           <a:ln>
             <a:solidFill>
-              <a:schemeClr val="tx1">
-                <a:lumMod val="50000"/>
-              </a:schemeClr>
+              <a:srgbClr val="7030A0"/>
             </a:solidFill>
           </a:ln>
         </p:spPr>
@@ -11904,7 +11697,7 @@
         </p:blipFill>
         <p:spPr>
           <a:xfrm>
-            <a:off x="4048546" y="3083569"/>
+            <a:off x="5345389" y="3083569"/>
             <a:ext cx="1469056" cy="2217976"/>
           </a:xfrm>
           <a:prstGeom prst="rect">
@@ -11931,20 +11724,24 @@
           </p:cNvPicPr>
           <p:nvPr/>
         </p:nvPicPr>
-        <p:blipFill>
-          <a:blip r:embed="rId7"/>
-          <a:stretch>
-            <a:fillRect/>
-          </a:stretch>
+        <p:blipFill rotWithShape="1">
+          <a:blip r:embed="rId5"/>
+          <a:srcRect r="604"/>
+          <a:stretch/>
         </p:blipFill>
         <p:spPr>
           <a:xfrm>
-            <a:off x="7221677" y="2616566"/>
-            <a:ext cx="3641141" cy="1238952"/>
+            <a:off x="2722759" y="1778633"/>
+            <a:ext cx="3105140" cy="1062990"/>
           </a:xfrm>
           <a:prstGeom prst="rect">
             <a:avLst/>
           </a:prstGeom>
+          <a:ln w="12700">
+            <a:solidFill>
+              <a:srgbClr val="FF9966"/>
+            </a:solidFill>
+          </a:ln>
         </p:spPr>
       </p:pic>
       <p:pic>
@@ -11962,19 +11759,24 @@
           <p:nvPr/>
         </p:nvPicPr>
         <p:blipFill>
-          <a:blip r:embed="rId8"/>
+          <a:blip r:embed="rId6"/>
           <a:stretch>
             <a:fillRect/>
           </a:stretch>
         </p:blipFill>
         <p:spPr>
           <a:xfrm>
-            <a:off x="5607994" y="0"/>
-            <a:ext cx="6559560" cy="1700117"/>
+            <a:off x="2544289" y="497777"/>
+            <a:ext cx="4538663" cy="1176338"/>
           </a:xfrm>
           <a:prstGeom prst="rect">
             <a:avLst/>
           </a:prstGeom>
+          <a:ln w="12700">
+            <a:solidFill>
+              <a:srgbClr val="7030A0"/>
+            </a:solidFill>
+          </a:ln>
         </p:spPr>
       </p:pic>
     </p:spTree>

</xml_diff>

<commit_message>
Refresh SI figures where structures are available
</commit_message>
<xml_diff>
--- a/pres/Scaffold analytics figures to modify with chemical structures.pptx
+++ b/pres/Scaffold analytics figures to modify with chemical structures.pptx
@@ -5,7 +5,7 @@
     <p:sldMasterId id="2147483648" r:id="rId1"/>
   </p:sldMasterIdLst>
   <p:notesMasterIdLst>
-    <p:notesMasterId r:id="rId20"/>
+    <p:notesMasterId r:id="rId22"/>
   </p:notesMasterIdLst>
   <p:sldIdLst>
     <p:sldId id="256" r:id="rId2"/>
@@ -26,6 +26,8 @@
     <p:sldId id="280" r:id="rId17"/>
     <p:sldId id="302" r:id="rId18"/>
     <p:sldId id="307" r:id="rId19"/>
+    <p:sldId id="311" r:id="rId20"/>
+    <p:sldId id="312" r:id="rId21"/>
   </p:sldIdLst>
   <p:sldSz cx="12192000" cy="6858000"/>
   <p:notesSz cx="6858000" cy="9144000"/>
@@ -12048,6 +12050,518 @@
 </p:sld>
 </file>
 
+<file path=ppt/slides/slide19.xml><?xml version="1.0" encoding="utf-8"?>
+<p:sld xmlns:a="http://schemas.openxmlformats.org/drawingml/2006/main" xmlns:r="http://schemas.openxmlformats.org/officeDocument/2006/relationships" xmlns:p="http://schemas.openxmlformats.org/presentationml/2006/main">
+  <p:cSld>
+    <p:spTree>
+      <p:nvGrpSpPr>
+        <p:cNvPr id="1" name=""/>
+        <p:cNvGrpSpPr/>
+        <p:nvPr/>
+      </p:nvGrpSpPr>
+      <p:grpSpPr>
+        <a:xfrm>
+          <a:off x="0" y="0"/>
+          <a:ext cx="0" cy="0"/>
+          <a:chOff x="0" y="0"/>
+          <a:chExt cx="0" cy="0"/>
+        </a:xfrm>
+      </p:grpSpPr>
+      <p:sp>
+        <p:nvSpPr>
+          <p:cNvPr id="2" name="Title 1">
+            <a:extLst>
+              <a:ext uri="{FF2B5EF4-FFF2-40B4-BE49-F238E27FC236}">
+                <a16:creationId xmlns:a16="http://schemas.microsoft.com/office/drawing/2014/main" id="{EC5DACBC-567B-4C4D-8C01-CBAB07EB9B14}"/>
+              </a:ext>
+            </a:extLst>
+          </p:cNvPr>
+          <p:cNvSpPr>
+            <a:spLocks noGrp="1"/>
+          </p:cNvSpPr>
+          <p:nvPr>
+            <p:ph type="title"/>
+          </p:nvPr>
+        </p:nvSpPr>
+        <p:spPr>
+          <a:xfrm>
+            <a:off x="-116483" y="2579"/>
+            <a:ext cx="10102852" cy="338554"/>
+          </a:xfrm>
+        </p:spPr>
+        <p:txBody>
+          <a:bodyPr>
+            <a:normAutofit fontScale="90000"/>
+          </a:bodyPr>
+          <a:lstStyle/>
+          <a:p>
+            <a:r>
+              <a:rPr lang="en-US" dirty="0"/>
+              <a:t>SI S9: structure group stats</a:t>
+            </a:r>
+          </a:p>
+        </p:txBody>
+      </p:sp>
+      <p:pic>
+        <p:nvPicPr>
+          <p:cNvPr id="6" name="Picture 5">
+            <a:extLst>
+              <a:ext uri="{FF2B5EF4-FFF2-40B4-BE49-F238E27FC236}">
+                <a16:creationId xmlns:a16="http://schemas.microsoft.com/office/drawing/2014/main" id="{86BEC4CC-BA65-487C-9374-9B5B4D5A839C}"/>
+              </a:ext>
+            </a:extLst>
+          </p:cNvPr>
+          <p:cNvPicPr>
+            <a:picLocks noChangeAspect="1"/>
+          </p:cNvPicPr>
+          <p:nvPr/>
+        </p:nvPicPr>
+        <p:blipFill rotWithShape="1">
+          <a:blip r:embed="rId2"/>
+          <a:srcRect t="13547" r="13282"/>
+          <a:stretch/>
+        </p:blipFill>
+        <p:spPr>
+          <a:xfrm>
+            <a:off x="577784" y="791849"/>
+            <a:ext cx="8524100" cy="3392663"/>
+          </a:xfrm>
+          <a:prstGeom prst="rect">
+            <a:avLst/>
+          </a:prstGeom>
+        </p:spPr>
+      </p:pic>
+      <p:pic>
+        <p:nvPicPr>
+          <p:cNvPr id="7" name="Picture 6">
+            <a:extLst>
+              <a:ext uri="{FF2B5EF4-FFF2-40B4-BE49-F238E27FC236}">
+                <a16:creationId xmlns:a16="http://schemas.microsoft.com/office/drawing/2014/main" id="{0555244B-3528-4C9E-8981-EEDA5BAC5C6B}"/>
+              </a:ext>
+            </a:extLst>
+          </p:cNvPr>
+          <p:cNvPicPr>
+            <a:picLocks noChangeAspect="1"/>
+          </p:cNvPicPr>
+          <p:nvPr/>
+        </p:nvPicPr>
+        <p:blipFill>
+          <a:blip r:embed="rId3"/>
+          <a:stretch>
+            <a:fillRect/>
+          </a:stretch>
+        </p:blipFill>
+        <p:spPr>
+          <a:xfrm>
+            <a:off x="3727934" y="5058871"/>
+            <a:ext cx="1491901" cy="1136999"/>
+          </a:xfrm>
+          <a:prstGeom prst="rect">
+            <a:avLst/>
+          </a:prstGeom>
+        </p:spPr>
+      </p:pic>
+      <p:pic>
+        <p:nvPicPr>
+          <p:cNvPr id="8" name="Picture 7">
+            <a:extLst>
+              <a:ext uri="{FF2B5EF4-FFF2-40B4-BE49-F238E27FC236}">
+                <a16:creationId xmlns:a16="http://schemas.microsoft.com/office/drawing/2014/main" id="{EC85089F-CB58-4C9D-8173-0D55F68F68A9}"/>
+              </a:ext>
+            </a:extLst>
+          </p:cNvPr>
+          <p:cNvPicPr>
+            <a:picLocks noChangeAspect="1"/>
+          </p:cNvPicPr>
+          <p:nvPr/>
+        </p:nvPicPr>
+        <p:blipFill>
+          <a:blip r:embed="rId4"/>
+          <a:stretch>
+            <a:fillRect/>
+          </a:stretch>
+        </p:blipFill>
+        <p:spPr>
+          <a:xfrm>
+            <a:off x="9182964" y="5058871"/>
+            <a:ext cx="1367028" cy="1551051"/>
+          </a:xfrm>
+          <a:prstGeom prst="rect">
+            <a:avLst/>
+          </a:prstGeom>
+        </p:spPr>
+      </p:pic>
+      <p:pic>
+        <p:nvPicPr>
+          <p:cNvPr id="9" name="Picture 8">
+            <a:extLst>
+              <a:ext uri="{FF2B5EF4-FFF2-40B4-BE49-F238E27FC236}">
+                <a16:creationId xmlns:a16="http://schemas.microsoft.com/office/drawing/2014/main" id="{B59E8F73-7AF0-494B-A4DD-D49027DF56BF}"/>
+              </a:ext>
+            </a:extLst>
+          </p:cNvPr>
+          <p:cNvPicPr>
+            <a:picLocks noChangeAspect="1"/>
+          </p:cNvPicPr>
+          <p:nvPr/>
+        </p:nvPicPr>
+        <p:blipFill>
+          <a:blip r:embed="rId5"/>
+          <a:stretch>
+            <a:fillRect/>
+          </a:stretch>
+        </p:blipFill>
+        <p:spPr>
+          <a:xfrm>
+            <a:off x="7156498" y="5058871"/>
+            <a:ext cx="1945386" cy="1531334"/>
+          </a:xfrm>
+          <a:prstGeom prst="rect">
+            <a:avLst/>
+          </a:prstGeom>
+        </p:spPr>
+      </p:pic>
+      <p:pic>
+        <p:nvPicPr>
+          <p:cNvPr id="10" name="Picture 9">
+            <a:extLst>
+              <a:ext uri="{FF2B5EF4-FFF2-40B4-BE49-F238E27FC236}">
+                <a16:creationId xmlns:a16="http://schemas.microsoft.com/office/drawing/2014/main" id="{B06F0A43-72FF-482B-903F-B386C51022D3}"/>
+              </a:ext>
+            </a:extLst>
+          </p:cNvPr>
+          <p:cNvPicPr>
+            <a:picLocks noChangeAspect="1"/>
+          </p:cNvPicPr>
+          <p:nvPr/>
+        </p:nvPicPr>
+        <p:blipFill>
+          <a:blip r:embed="rId6"/>
+          <a:stretch>
+            <a:fillRect/>
+          </a:stretch>
+        </p:blipFill>
+        <p:spPr>
+          <a:xfrm>
+            <a:off x="1662037" y="5058871"/>
+            <a:ext cx="1984819" cy="1748218"/>
+          </a:xfrm>
+          <a:prstGeom prst="rect">
+            <a:avLst/>
+          </a:prstGeom>
+        </p:spPr>
+      </p:pic>
+      <p:pic>
+        <p:nvPicPr>
+          <p:cNvPr id="11" name="Picture 10">
+            <a:extLst>
+              <a:ext uri="{FF2B5EF4-FFF2-40B4-BE49-F238E27FC236}">
+                <a16:creationId xmlns:a16="http://schemas.microsoft.com/office/drawing/2014/main" id="{221E5C75-CE8F-433B-8BBA-266FCD9466A3}"/>
+              </a:ext>
+            </a:extLst>
+          </p:cNvPr>
+          <p:cNvPicPr>
+            <a:picLocks noChangeAspect="1"/>
+          </p:cNvPicPr>
+          <p:nvPr/>
+        </p:nvPicPr>
+        <p:blipFill>
+          <a:blip r:embed="rId7"/>
+          <a:stretch>
+            <a:fillRect/>
+          </a:stretch>
+        </p:blipFill>
+        <p:spPr>
+          <a:xfrm>
+            <a:off x="102203" y="5058871"/>
+            <a:ext cx="1478756" cy="1156716"/>
+          </a:xfrm>
+          <a:prstGeom prst="rect">
+            <a:avLst/>
+          </a:prstGeom>
+        </p:spPr>
+      </p:pic>
+      <p:pic>
+        <p:nvPicPr>
+          <p:cNvPr id="12" name="Picture 11">
+            <a:extLst>
+              <a:ext uri="{FF2B5EF4-FFF2-40B4-BE49-F238E27FC236}">
+                <a16:creationId xmlns:a16="http://schemas.microsoft.com/office/drawing/2014/main" id="{48710EE0-698D-4C2A-B24C-A40913DC019A}"/>
+              </a:ext>
+            </a:extLst>
+          </p:cNvPr>
+          <p:cNvPicPr>
+            <a:picLocks noChangeAspect="1"/>
+          </p:cNvPicPr>
+          <p:nvPr/>
+        </p:nvPicPr>
+        <p:blipFill>
+          <a:blip r:embed="rId8"/>
+          <a:stretch>
+            <a:fillRect/>
+          </a:stretch>
+        </p:blipFill>
+        <p:spPr>
+          <a:xfrm>
+            <a:off x="5300913" y="5058871"/>
+            <a:ext cx="1774507" cy="1012126"/>
+          </a:xfrm>
+          <a:prstGeom prst="rect">
+            <a:avLst/>
+          </a:prstGeom>
+        </p:spPr>
+      </p:pic>
+      <p:pic>
+        <p:nvPicPr>
+          <p:cNvPr id="13" name="Picture 12">
+            <a:extLst>
+              <a:ext uri="{FF2B5EF4-FFF2-40B4-BE49-F238E27FC236}">
+                <a16:creationId xmlns:a16="http://schemas.microsoft.com/office/drawing/2014/main" id="{380FB405-9981-4E16-ABFB-91755658E8D2}"/>
+              </a:ext>
+            </a:extLst>
+          </p:cNvPr>
+          <p:cNvPicPr>
+            <a:picLocks noChangeAspect="1"/>
+          </p:cNvPicPr>
+          <p:nvPr/>
+        </p:nvPicPr>
+        <p:blipFill rotWithShape="1">
+          <a:blip r:embed="rId2"/>
+          <a:srcRect l="88967" t="37328" r="2977" b="27120"/>
+          <a:stretch/>
+        </p:blipFill>
+        <p:spPr>
+          <a:xfrm>
+            <a:off x="10209227" y="1385739"/>
+            <a:ext cx="1235931" cy="2177592"/>
+          </a:xfrm>
+          <a:prstGeom prst="rect">
+            <a:avLst/>
+          </a:prstGeom>
+        </p:spPr>
+      </p:pic>
+      <p:pic>
+        <p:nvPicPr>
+          <p:cNvPr id="14" name="Picture 13">
+            <a:extLst>
+              <a:ext uri="{FF2B5EF4-FFF2-40B4-BE49-F238E27FC236}">
+                <a16:creationId xmlns:a16="http://schemas.microsoft.com/office/drawing/2014/main" id="{0141179D-8B37-4A49-B228-1C2C9B5D4D47}"/>
+              </a:ext>
+            </a:extLst>
+          </p:cNvPr>
+          <p:cNvPicPr>
+            <a:picLocks noChangeAspect="1"/>
+          </p:cNvPicPr>
+          <p:nvPr/>
+        </p:nvPicPr>
+        <p:blipFill rotWithShape="1">
+          <a:blip r:embed="rId2"/>
+          <a:srcRect l="88967" t="68394" r="6128" b="27121"/>
+          <a:stretch/>
+        </p:blipFill>
+        <p:spPr>
+          <a:xfrm>
+            <a:off x="9364547" y="4556810"/>
+            <a:ext cx="882351" cy="322131"/>
+          </a:xfrm>
+          <a:prstGeom prst="rect">
+            <a:avLst/>
+          </a:prstGeom>
+        </p:spPr>
+      </p:pic>
+      <p:pic>
+        <p:nvPicPr>
+          <p:cNvPr id="15" name="Picture 14">
+            <a:extLst>
+              <a:ext uri="{FF2B5EF4-FFF2-40B4-BE49-F238E27FC236}">
+                <a16:creationId xmlns:a16="http://schemas.microsoft.com/office/drawing/2014/main" id="{A1AFC1AA-E820-4778-BC16-7DFDB29B24AA}"/>
+              </a:ext>
+            </a:extLst>
+          </p:cNvPr>
+          <p:cNvPicPr>
+            <a:picLocks noChangeAspect="1"/>
+          </p:cNvPicPr>
+          <p:nvPr/>
+        </p:nvPicPr>
+        <p:blipFill rotWithShape="1">
+          <a:blip r:embed="rId2"/>
+          <a:srcRect l="88967" t="45767" r="6128" b="49519"/>
+          <a:stretch/>
+        </p:blipFill>
+        <p:spPr>
+          <a:xfrm>
+            <a:off x="502209" y="4509675"/>
+            <a:ext cx="882351" cy="338555"/>
+          </a:xfrm>
+          <a:prstGeom prst="rect">
+            <a:avLst/>
+          </a:prstGeom>
+        </p:spPr>
+      </p:pic>
+      <p:pic>
+        <p:nvPicPr>
+          <p:cNvPr id="16" name="Picture 15">
+            <a:extLst>
+              <a:ext uri="{FF2B5EF4-FFF2-40B4-BE49-F238E27FC236}">
+                <a16:creationId xmlns:a16="http://schemas.microsoft.com/office/drawing/2014/main" id="{3E59D813-893B-46D6-9806-41C50014EA45}"/>
+              </a:ext>
+            </a:extLst>
+          </p:cNvPr>
+          <p:cNvPicPr>
+            <a:picLocks noChangeAspect="1"/>
+          </p:cNvPicPr>
+          <p:nvPr/>
+        </p:nvPicPr>
+        <p:blipFill rotWithShape="1">
+          <a:blip r:embed="rId2"/>
+          <a:srcRect l="88967" t="50442" r="6128" b="44844"/>
+          <a:stretch/>
+        </p:blipFill>
+        <p:spPr>
+          <a:xfrm>
+            <a:off x="2314270" y="4528529"/>
+            <a:ext cx="882351" cy="338555"/>
+          </a:xfrm>
+          <a:prstGeom prst="rect">
+            <a:avLst/>
+          </a:prstGeom>
+        </p:spPr>
+      </p:pic>
+      <p:pic>
+        <p:nvPicPr>
+          <p:cNvPr id="17" name="Picture 16">
+            <a:extLst>
+              <a:ext uri="{FF2B5EF4-FFF2-40B4-BE49-F238E27FC236}">
+                <a16:creationId xmlns:a16="http://schemas.microsoft.com/office/drawing/2014/main" id="{B83B5402-D19D-4C61-995B-9FABDCE6D71C}"/>
+              </a:ext>
+            </a:extLst>
+          </p:cNvPr>
+          <p:cNvPicPr>
+            <a:picLocks noChangeAspect="1"/>
+          </p:cNvPicPr>
+          <p:nvPr/>
+        </p:nvPicPr>
+        <p:blipFill rotWithShape="1">
+          <a:blip r:embed="rId2"/>
+          <a:srcRect l="88967" t="53947" r="6128" b="41339"/>
+          <a:stretch/>
+        </p:blipFill>
+        <p:spPr>
+          <a:xfrm>
+            <a:off x="4050917" y="4471967"/>
+            <a:ext cx="882351" cy="338555"/>
+          </a:xfrm>
+          <a:prstGeom prst="rect">
+            <a:avLst/>
+          </a:prstGeom>
+        </p:spPr>
+      </p:pic>
+      <p:pic>
+        <p:nvPicPr>
+          <p:cNvPr id="18" name="Picture 17">
+            <a:extLst>
+              <a:ext uri="{FF2B5EF4-FFF2-40B4-BE49-F238E27FC236}">
+                <a16:creationId xmlns:a16="http://schemas.microsoft.com/office/drawing/2014/main" id="{DDD40AE4-BD8E-4A5C-B51C-C8587373D186}"/>
+              </a:ext>
+            </a:extLst>
+          </p:cNvPr>
+          <p:cNvPicPr>
+            <a:picLocks noChangeAspect="1"/>
+          </p:cNvPicPr>
+          <p:nvPr/>
+        </p:nvPicPr>
+        <p:blipFill rotWithShape="1">
+          <a:blip r:embed="rId2"/>
+          <a:srcRect l="88967" t="58661" r="6128" b="35887"/>
+          <a:stretch/>
+        </p:blipFill>
+        <p:spPr>
+          <a:xfrm>
+            <a:off x="5806414" y="4490821"/>
+            <a:ext cx="882351" cy="391561"/>
+          </a:xfrm>
+          <a:prstGeom prst="rect">
+            <a:avLst/>
+          </a:prstGeom>
+        </p:spPr>
+      </p:pic>
+      <p:pic>
+        <p:nvPicPr>
+          <p:cNvPr id="19" name="Picture 18">
+            <a:extLst>
+              <a:ext uri="{FF2B5EF4-FFF2-40B4-BE49-F238E27FC236}">
+                <a16:creationId xmlns:a16="http://schemas.microsoft.com/office/drawing/2014/main" id="{1876D731-CF6B-434F-B0D2-2E98E0E118A8}"/>
+              </a:ext>
+            </a:extLst>
+          </p:cNvPr>
+          <p:cNvPicPr>
+            <a:picLocks noChangeAspect="1"/>
+          </p:cNvPicPr>
+          <p:nvPr/>
+        </p:nvPicPr>
+        <p:blipFill rotWithShape="1">
+          <a:blip r:embed="rId2"/>
+          <a:srcRect l="88967" t="63376" r="6128" b="32139"/>
+          <a:stretch/>
+        </p:blipFill>
+        <p:spPr>
+          <a:xfrm>
+            <a:off x="7741025" y="4519102"/>
+            <a:ext cx="882351" cy="322131"/>
+          </a:xfrm>
+          <a:prstGeom prst="rect">
+            <a:avLst/>
+          </a:prstGeom>
+        </p:spPr>
+      </p:pic>
+      <p:pic>
+        <p:nvPicPr>
+          <p:cNvPr id="22" name="Picture 21">
+            <a:extLst>
+              <a:ext uri="{FF2B5EF4-FFF2-40B4-BE49-F238E27FC236}">
+                <a16:creationId xmlns:a16="http://schemas.microsoft.com/office/drawing/2014/main" id="{5F52FA59-DF20-4C8C-8F52-C6ED6B58FBE4}"/>
+              </a:ext>
+            </a:extLst>
+          </p:cNvPr>
+          <p:cNvPicPr>
+            <a:picLocks noChangeAspect="1"/>
+          </p:cNvPicPr>
+          <p:nvPr/>
+        </p:nvPicPr>
+        <p:blipFill>
+          <a:blip r:embed="rId9"/>
+          <a:stretch>
+            <a:fillRect/>
+          </a:stretch>
+        </p:blipFill>
+        <p:spPr>
+          <a:xfrm>
+            <a:off x="4749351" y="787003"/>
+            <a:ext cx="4314825" cy="523875"/>
+          </a:xfrm>
+          <a:prstGeom prst="rect">
+            <a:avLst/>
+          </a:prstGeom>
+          <a:ln>
+            <a:solidFill>
+              <a:schemeClr val="tx1"/>
+            </a:solidFill>
+          </a:ln>
+        </p:spPr>
+      </p:pic>
+    </p:spTree>
+    <p:extLst>
+      <p:ext uri="{BB962C8B-B14F-4D97-AF65-F5344CB8AC3E}">
+        <p14:creationId xmlns:p14="http://schemas.microsoft.com/office/powerpoint/2010/main" val="1761261220"/>
+      </p:ext>
+    </p:extLst>
+  </p:cSld>
+  <p:clrMapOvr>
+    <a:masterClrMapping/>
+  </p:clrMapOvr>
+</p:sld>
+</file>
+
 <file path=ppt/slides/slide2.xml><?xml version="1.0" encoding="utf-8"?>
 <p:sld xmlns:a="http://schemas.openxmlformats.org/drawingml/2006/main" xmlns:r="http://schemas.openxmlformats.org/officeDocument/2006/relationships" xmlns:p="http://schemas.openxmlformats.org/presentationml/2006/main">
   <p:cSld>
@@ -12127,6 +12641,810 @@
     <p:extLst>
       <p:ext uri="{BB962C8B-B14F-4D97-AF65-F5344CB8AC3E}">
         <p14:creationId xmlns:p14="http://schemas.microsoft.com/office/powerpoint/2010/main" val="4283370273"/>
+      </p:ext>
+    </p:extLst>
+  </p:cSld>
+  <p:clrMapOvr>
+    <a:masterClrMapping/>
+  </p:clrMapOvr>
+</p:sld>
+</file>
+
+<file path=ppt/slides/slide20.xml><?xml version="1.0" encoding="utf-8"?>
+<p:sld xmlns:a="http://schemas.openxmlformats.org/drawingml/2006/main" xmlns:r="http://schemas.openxmlformats.org/officeDocument/2006/relationships" xmlns:p="http://schemas.openxmlformats.org/presentationml/2006/main">
+  <p:cSld>
+    <p:spTree>
+      <p:nvGrpSpPr>
+        <p:cNvPr id="1" name=""/>
+        <p:cNvGrpSpPr/>
+        <p:nvPr/>
+      </p:nvGrpSpPr>
+      <p:grpSpPr>
+        <a:xfrm>
+          <a:off x="0" y="0"/>
+          <a:ext cx="0" cy="0"/>
+          <a:chOff x="0" y="0"/>
+          <a:chExt cx="0" cy="0"/>
+        </a:xfrm>
+      </p:grpSpPr>
+      <p:sp>
+        <p:nvSpPr>
+          <p:cNvPr id="2" name="Title 1">
+            <a:extLst>
+              <a:ext uri="{FF2B5EF4-FFF2-40B4-BE49-F238E27FC236}">
+                <a16:creationId xmlns:a16="http://schemas.microsoft.com/office/drawing/2014/main" id="{46A827EE-E6CB-42B0-943B-72B577226683}"/>
+              </a:ext>
+            </a:extLst>
+          </p:cNvPr>
+          <p:cNvSpPr>
+            <a:spLocks noGrp="1"/>
+          </p:cNvSpPr>
+          <p:nvPr>
+            <p:ph type="title"/>
+          </p:nvPr>
+        </p:nvSpPr>
+        <p:spPr>
+          <a:xfrm>
+            <a:off x="0" y="50048"/>
+            <a:ext cx="5434131" cy="334532"/>
+          </a:xfrm>
+        </p:spPr>
+        <p:txBody>
+          <a:bodyPr>
+            <a:normAutofit fontScale="90000"/>
+          </a:bodyPr>
+          <a:lstStyle/>
+          <a:p>
+            <a:r>
+              <a:rPr lang="en-US" dirty="0"/>
+              <a:t>S8 qualitative comparison </a:t>
+            </a:r>
+          </a:p>
+        </p:txBody>
+      </p:sp>
+      <p:pic>
+        <p:nvPicPr>
+          <p:cNvPr id="8" name="Picture 7">
+            <a:extLst>
+              <a:ext uri="{FF2B5EF4-FFF2-40B4-BE49-F238E27FC236}">
+                <a16:creationId xmlns:a16="http://schemas.microsoft.com/office/drawing/2014/main" id="{35F247DC-87F6-4388-851C-981BA1779A57}"/>
+              </a:ext>
+            </a:extLst>
+          </p:cNvPr>
+          <p:cNvPicPr>
+            <a:picLocks noChangeAspect="1"/>
+          </p:cNvPicPr>
+          <p:nvPr/>
+        </p:nvPicPr>
+        <p:blipFill rotWithShape="1">
+          <a:blip r:embed="rId2"/>
+          <a:srcRect l="6321" r="17155"/>
+          <a:stretch/>
+        </p:blipFill>
+        <p:spPr>
+          <a:xfrm>
+            <a:off x="2305858" y="760231"/>
+            <a:ext cx="6640179" cy="5676900"/>
+          </a:xfrm>
+          <a:prstGeom prst="rect">
+            <a:avLst/>
+          </a:prstGeom>
+        </p:spPr>
+      </p:pic>
+      <p:pic>
+        <p:nvPicPr>
+          <p:cNvPr id="9" name="Picture 3" descr="http://images.sodahead.com/polls/003962351/5331458487_normal_ian_symbol_north_arrow_2_answer_1_xlarge.png">
+            <a:extLst>
+              <a:ext uri="{FF2B5EF4-FFF2-40B4-BE49-F238E27FC236}">
+                <a16:creationId xmlns:a16="http://schemas.microsoft.com/office/drawing/2014/main" id="{964CE46B-975D-400D-9DAB-B791703AEC01}"/>
+              </a:ext>
+            </a:extLst>
+          </p:cNvPr>
+          <p:cNvPicPr>
+            <a:picLocks noChangeAspect="1" noChangeArrowheads="1"/>
+          </p:cNvPicPr>
+          <p:nvPr/>
+        </p:nvPicPr>
+        <p:blipFill>
+          <a:blip r:embed="rId3" cstate="print"/>
+          <a:srcRect/>
+          <a:stretch>
+            <a:fillRect/>
+          </a:stretch>
+        </p:blipFill>
+        <p:spPr bwMode="auto">
+          <a:xfrm rot="3390068">
+            <a:off x="2380624" y="5735108"/>
+            <a:ext cx="427396" cy="408969"/>
+          </a:xfrm>
+          <a:prstGeom prst="rect">
+            <a:avLst/>
+          </a:prstGeom>
+          <a:noFill/>
+        </p:spPr>
+      </p:pic>
+      <p:sp>
+        <p:nvSpPr>
+          <p:cNvPr id="10" name="TextBox 9">
+            <a:extLst>
+              <a:ext uri="{FF2B5EF4-FFF2-40B4-BE49-F238E27FC236}">
+                <a16:creationId xmlns:a16="http://schemas.microsoft.com/office/drawing/2014/main" id="{28606A68-2DCE-4465-9DF8-C27C68F9BC29}"/>
+              </a:ext>
+            </a:extLst>
+          </p:cNvPr>
+          <p:cNvSpPr txBox="1"/>
+          <p:nvPr/>
+        </p:nvSpPr>
+        <p:spPr>
+          <a:xfrm rot="16200000">
+            <a:off x="340527" y="3033962"/>
+            <a:ext cx="3661340" cy="338554"/>
+          </a:xfrm>
+          <a:prstGeom prst="rect">
+            <a:avLst/>
+          </a:prstGeom>
+          <a:noFill/>
+        </p:spPr>
+        <p:txBody>
+          <a:bodyPr wrap="square" rtlCol="0">
+            <a:spAutoFit/>
+          </a:bodyPr>
+          <a:lstStyle/>
+          <a:p>
+            <a:r>
+              <a:rPr lang="en-US" sz="1600" dirty="0"/>
+              <a:t>Avg(% inhibition in DD2/resistant strain)</a:t>
+            </a:r>
+          </a:p>
+        </p:txBody>
+      </p:sp>
+      <p:pic>
+        <p:nvPicPr>
+          <p:cNvPr id="11" name="Picture 10">
+            <a:extLst>
+              <a:ext uri="{FF2B5EF4-FFF2-40B4-BE49-F238E27FC236}">
+                <a16:creationId xmlns:a16="http://schemas.microsoft.com/office/drawing/2014/main" id="{005326BF-88D7-4055-A6F1-8618FA17341A}"/>
+              </a:ext>
+            </a:extLst>
+          </p:cNvPr>
+          <p:cNvPicPr>
+            <a:picLocks noChangeAspect="1"/>
+          </p:cNvPicPr>
+          <p:nvPr/>
+        </p:nvPicPr>
+        <p:blipFill>
+          <a:blip r:embed="rId4"/>
+          <a:stretch>
+            <a:fillRect/>
+          </a:stretch>
+        </p:blipFill>
+        <p:spPr>
+          <a:xfrm>
+            <a:off x="5736800" y="2584049"/>
+            <a:ext cx="3284652" cy="1840728"/>
+          </a:xfrm>
+          <a:prstGeom prst="rect">
+            <a:avLst/>
+          </a:prstGeom>
+        </p:spPr>
+      </p:pic>
+      <p:sp>
+        <p:nvSpPr>
+          <p:cNvPr id="12" name="TextBox 11">
+            <a:extLst>
+              <a:ext uri="{FF2B5EF4-FFF2-40B4-BE49-F238E27FC236}">
+                <a16:creationId xmlns:a16="http://schemas.microsoft.com/office/drawing/2014/main" id="{D65DBE8A-56C0-4EC0-AB96-7928656A6E93}"/>
+              </a:ext>
+            </a:extLst>
+          </p:cNvPr>
+          <p:cNvSpPr txBox="1"/>
+          <p:nvPr/>
+        </p:nvSpPr>
+        <p:spPr>
+          <a:xfrm>
+            <a:off x="4685123" y="2879575"/>
+            <a:ext cx="1131215" cy="1169551"/>
+          </a:xfrm>
+          <a:prstGeom prst="rect">
+            <a:avLst/>
+          </a:prstGeom>
+          <a:solidFill>
+            <a:schemeClr val="bg1"/>
+          </a:solidFill>
+        </p:spPr>
+        <p:txBody>
+          <a:bodyPr wrap="square" rtlCol="0">
+            <a:spAutoFit/>
+          </a:bodyPr>
+          <a:lstStyle/>
+          <a:p>
+            <a:pPr>
+              <a:buClr>
+                <a:schemeClr val="tx1"/>
+              </a:buClr>
+            </a:pPr>
+            <a:r>
+              <a:rPr lang="en-US" sz="1400" dirty="0">
+                <a:solidFill>
+                  <a:srgbClr val="0070C0"/>
+                </a:solidFill>
+              </a:rPr>
+              <a:t>Framework not active in 3D7 strain; </a:t>
+            </a:r>
+            <a:r>
+              <a:rPr lang="en-US" sz="1400" i="1" dirty="0">
+                <a:solidFill>
+                  <a:srgbClr val="0070C0"/>
+                </a:solidFill>
+              </a:rPr>
+              <a:t>not found by R-group tool</a:t>
+            </a:r>
+          </a:p>
+        </p:txBody>
+      </p:sp>
+      <p:sp>
+        <p:nvSpPr>
+          <p:cNvPr id="13" name="Oval 12">
+            <a:extLst>
+              <a:ext uri="{FF2B5EF4-FFF2-40B4-BE49-F238E27FC236}">
+                <a16:creationId xmlns:a16="http://schemas.microsoft.com/office/drawing/2014/main" id="{E58FA135-95FF-4E16-9DF4-6E6BEFC009CB}"/>
+              </a:ext>
+            </a:extLst>
+          </p:cNvPr>
+          <p:cNvSpPr/>
+          <p:nvPr/>
+        </p:nvSpPr>
+        <p:spPr bwMode="auto">
+          <a:xfrm>
+            <a:off x="2611226" y="760232"/>
+            <a:ext cx="2073897" cy="4145040"/>
+          </a:xfrm>
+          <a:prstGeom prst="ellipse">
+            <a:avLst/>
+          </a:prstGeom>
+          <a:noFill/>
+          <a:ln w="19050">
+            <a:solidFill>
+              <a:srgbClr val="0070C0"/>
+            </a:solidFill>
+            <a:headEnd/>
+            <a:tailEnd/>
+          </a:ln>
+          <a:effectLst/>
+        </p:spPr>
+        <p:style>
+          <a:lnRef idx="1">
+            <a:schemeClr val="accent1"/>
+          </a:lnRef>
+          <a:fillRef idx="3">
+            <a:schemeClr val="accent1"/>
+          </a:fillRef>
+          <a:effectRef idx="2">
+            <a:schemeClr val="accent1"/>
+          </a:effectRef>
+          <a:fontRef idx="minor">
+            <a:schemeClr val="lt1"/>
+          </a:fontRef>
+        </p:style>
+        <p:txBody>
+          <a:bodyPr rot="0" spcFirstLastPara="0" vertOverflow="overflow" horzOverflow="overflow" vert="horz" wrap="square" lIns="72000" tIns="72000" rIns="72000" bIns="72000" numCol="1" spcCol="0" rtlCol="0" fromWordArt="0" anchor="t" anchorCtr="0" forceAA="0" compatLnSpc="1">
+            <a:prstTxWarp prst="textNoShape">
+              <a:avLst/>
+            </a:prstTxWarp>
+            <a:noAutofit/>
+          </a:bodyPr>
+          <a:lstStyle/>
+          <a:p>
+            <a:pPr marL="180975" indent="-180975" algn="ctr" eaLnBrk="0" fontAlgn="auto" hangingPunct="0">
+              <a:spcBef>
+                <a:spcPts val="0"/>
+              </a:spcBef>
+              <a:spcAft>
+                <a:spcPts val="0"/>
+              </a:spcAft>
+              <a:buClr>
+                <a:schemeClr val="bg1"/>
+              </a:buClr>
+              <a:buFont typeface="Arial" pitchFamily="34" charset="0"/>
+              <a:buChar char="–"/>
+            </a:pPr>
+            <a:endParaRPr lang="en-US" sz="1200" b="1" kern="0" dirty="0" err="1">
+              <a:solidFill>
+                <a:srgbClr val="FFFFFF"/>
+              </a:solidFill>
+              <a:latin typeface="Arial"/>
+            </a:endParaRPr>
+          </a:p>
+        </p:txBody>
+      </p:sp>
+      <p:pic>
+        <p:nvPicPr>
+          <p:cNvPr id="14" name="Picture 13">
+            <a:extLst>
+              <a:ext uri="{FF2B5EF4-FFF2-40B4-BE49-F238E27FC236}">
+                <a16:creationId xmlns:a16="http://schemas.microsoft.com/office/drawing/2014/main" id="{3017774B-CBBF-470A-92AC-4A45E8934604}"/>
+              </a:ext>
+            </a:extLst>
+          </p:cNvPr>
+          <p:cNvPicPr>
+            <a:picLocks noChangeAspect="1"/>
+          </p:cNvPicPr>
+          <p:nvPr/>
+        </p:nvPicPr>
+        <p:blipFill>
+          <a:blip r:embed="rId5"/>
+          <a:stretch>
+            <a:fillRect/>
+          </a:stretch>
+        </p:blipFill>
+        <p:spPr>
+          <a:xfrm>
+            <a:off x="4873658" y="1398474"/>
+            <a:ext cx="560473" cy="1424537"/>
+          </a:xfrm>
+          <a:prstGeom prst="rect">
+            <a:avLst/>
+          </a:prstGeom>
+        </p:spPr>
+      </p:pic>
+      <p:sp>
+        <p:nvSpPr>
+          <p:cNvPr id="15" name="Right Arrow 20">
+            <a:extLst>
+              <a:ext uri="{FF2B5EF4-FFF2-40B4-BE49-F238E27FC236}">
+                <a16:creationId xmlns:a16="http://schemas.microsoft.com/office/drawing/2014/main" id="{F16B21C2-30BD-4AB1-BF6A-41B6AE4FBE49}"/>
+              </a:ext>
+            </a:extLst>
+          </p:cNvPr>
+          <p:cNvSpPr/>
+          <p:nvPr/>
+        </p:nvSpPr>
+        <p:spPr bwMode="auto">
+          <a:xfrm rot="5400000">
+            <a:off x="7438563" y="3876291"/>
+            <a:ext cx="431568" cy="233838"/>
+          </a:xfrm>
+          <a:prstGeom prst="rightArrow">
+            <a:avLst/>
+          </a:prstGeom>
+          <a:solidFill>
+            <a:srgbClr val="FF6600"/>
+          </a:solidFill>
+          <a:ln w="9525" cap="flat" cmpd="sng" algn="ctr">
+            <a:noFill/>
+            <a:prstDash val="solid"/>
+            <a:headEnd/>
+            <a:tailEnd/>
+          </a:ln>
+          <a:effectLst/>
+        </p:spPr>
+        <p:txBody>
+          <a:bodyPr rot="0" spcFirstLastPara="0" vertOverflow="overflow" horzOverflow="overflow" vert="horz" wrap="square" lIns="72000" tIns="72000" rIns="72000" bIns="72000" numCol="1" spcCol="0" rtlCol="0" fromWordArt="0" anchor="t" anchorCtr="0" forceAA="0" compatLnSpc="1">
+            <a:prstTxWarp prst="textNoShape">
+              <a:avLst/>
+            </a:prstTxWarp>
+            <a:noAutofit/>
+          </a:bodyPr>
+          <a:lstStyle/>
+          <a:p>
+            <a:pPr marL="180975" marR="0" lvl="0" indent="-180975" algn="ctr" defTabSz="914400" eaLnBrk="0" fontAlgn="auto" latinLnBrk="0" hangingPunct="0">
+              <a:lnSpc>
+                <a:spcPct val="100000"/>
+              </a:lnSpc>
+              <a:spcBef>
+                <a:spcPts val="0"/>
+              </a:spcBef>
+              <a:spcAft>
+                <a:spcPts val="0"/>
+              </a:spcAft>
+              <a:buClr>
+                <a:srgbClr val="FFFFFF"/>
+              </a:buClr>
+              <a:buSzTx/>
+              <a:buFont typeface="Arial" pitchFamily="34" charset="0"/>
+              <a:buChar char="–"/>
+              <a:tabLst/>
+              <a:defRPr/>
+            </a:pPr>
+            <a:endParaRPr kumimoji="0" lang="en-US" sz="1200" b="1" i="0" u="none" strike="noStrike" kern="0" cap="none" spc="0" normalizeH="0" baseline="0" noProof="0" dirty="0" err="1">
+              <a:ln>
+                <a:noFill/>
+              </a:ln>
+              <a:solidFill>
+                <a:srgbClr val="FFFFFF"/>
+              </a:solidFill>
+              <a:effectLst/>
+              <a:uLnTx/>
+              <a:uFillTx/>
+              <a:latin typeface="Arial"/>
+              <a:ea typeface="+mn-ea"/>
+              <a:cs typeface="+mn-cs"/>
+            </a:endParaRPr>
+          </a:p>
+        </p:txBody>
+      </p:sp>
+      <p:sp>
+        <p:nvSpPr>
+          <p:cNvPr id="16" name="5-Point Star 45">
+            <a:extLst>
+              <a:ext uri="{FF2B5EF4-FFF2-40B4-BE49-F238E27FC236}">
+                <a16:creationId xmlns:a16="http://schemas.microsoft.com/office/drawing/2014/main" id="{66C187CE-0BEE-444E-8E9F-2E21F907CB0F}"/>
+              </a:ext>
+            </a:extLst>
+          </p:cNvPr>
+          <p:cNvSpPr/>
+          <p:nvPr/>
+        </p:nvSpPr>
+        <p:spPr bwMode="auto">
+          <a:xfrm>
+            <a:off x="7537943" y="5495871"/>
+            <a:ext cx="234461" cy="234462"/>
+          </a:xfrm>
+          <a:prstGeom prst="star5">
+            <a:avLst/>
+          </a:prstGeom>
+          <a:solidFill>
+            <a:srgbClr val="FF6600"/>
+          </a:solidFill>
+          <a:ln w="12700" cap="flat" cmpd="sng" algn="ctr">
+            <a:solidFill>
+              <a:srgbClr val="FFFF00"/>
+            </a:solidFill>
+            <a:prstDash val="solid"/>
+            <a:headEnd/>
+            <a:tailEnd/>
+          </a:ln>
+          <a:effectLst/>
+        </p:spPr>
+        <p:txBody>
+          <a:bodyPr rot="0" spcFirstLastPara="0" vertOverflow="overflow" horzOverflow="overflow" vert="horz" wrap="square" lIns="72000" tIns="72000" rIns="72000" bIns="72000" numCol="1" spcCol="0" rtlCol="0" fromWordArt="0" anchor="t" anchorCtr="0" forceAA="0" compatLnSpc="1">
+            <a:prstTxWarp prst="textNoShape">
+              <a:avLst/>
+            </a:prstTxWarp>
+            <a:noAutofit/>
+          </a:bodyPr>
+          <a:lstStyle/>
+          <a:p>
+            <a:pPr marL="180975" marR="0" lvl="0" indent="-180975" algn="ctr" defTabSz="914400" eaLnBrk="0" fontAlgn="auto" latinLnBrk="0" hangingPunct="0">
+              <a:lnSpc>
+                <a:spcPct val="100000"/>
+              </a:lnSpc>
+              <a:spcBef>
+                <a:spcPts val="0"/>
+              </a:spcBef>
+              <a:spcAft>
+                <a:spcPts val="0"/>
+              </a:spcAft>
+              <a:buClr>
+                <a:srgbClr val="FFFFFF"/>
+              </a:buClr>
+              <a:buSzTx/>
+              <a:buFont typeface="Arial" pitchFamily="34" charset="0"/>
+              <a:buChar char="–"/>
+              <a:tabLst/>
+              <a:defRPr/>
+            </a:pPr>
+            <a:endParaRPr kumimoji="0" lang="en-US" sz="1200" b="1" i="0" u="none" strike="noStrike" kern="0" cap="none" spc="0" normalizeH="0" baseline="0" noProof="0" dirty="0" err="1">
+              <a:ln>
+                <a:noFill/>
+              </a:ln>
+              <a:solidFill>
+                <a:srgbClr val="FFFFFF"/>
+              </a:solidFill>
+              <a:effectLst/>
+              <a:uLnTx/>
+              <a:uFillTx/>
+              <a:latin typeface="Arial"/>
+              <a:ea typeface="+mn-ea"/>
+              <a:cs typeface="+mn-cs"/>
+            </a:endParaRPr>
+          </a:p>
+        </p:txBody>
+      </p:sp>
+      <p:sp>
+        <p:nvSpPr>
+          <p:cNvPr id="17" name="Oval 16">
+            <a:extLst>
+              <a:ext uri="{FF2B5EF4-FFF2-40B4-BE49-F238E27FC236}">
+                <a16:creationId xmlns:a16="http://schemas.microsoft.com/office/drawing/2014/main" id="{75A1F4F6-EFFB-40F7-B0C9-440CFB304C0C}"/>
+              </a:ext>
+            </a:extLst>
+          </p:cNvPr>
+          <p:cNvSpPr/>
+          <p:nvPr/>
+        </p:nvSpPr>
+        <p:spPr bwMode="auto">
+          <a:xfrm rot="19250119">
+            <a:off x="6088105" y="3510783"/>
+            <a:ext cx="1174937" cy="508765"/>
+          </a:xfrm>
+          <a:prstGeom prst="ellipse">
+            <a:avLst/>
+          </a:prstGeom>
+          <a:noFill/>
+          <a:ln w="19050">
+            <a:solidFill>
+              <a:srgbClr val="0070C0"/>
+            </a:solidFill>
+            <a:headEnd/>
+            <a:tailEnd/>
+          </a:ln>
+          <a:effectLst/>
+        </p:spPr>
+        <p:style>
+          <a:lnRef idx="1">
+            <a:schemeClr val="accent1"/>
+          </a:lnRef>
+          <a:fillRef idx="3">
+            <a:schemeClr val="accent1"/>
+          </a:fillRef>
+          <a:effectRef idx="2">
+            <a:schemeClr val="accent1"/>
+          </a:effectRef>
+          <a:fontRef idx="minor">
+            <a:schemeClr val="lt1"/>
+          </a:fontRef>
+        </p:style>
+        <p:txBody>
+          <a:bodyPr rot="0" spcFirstLastPara="0" vertOverflow="overflow" horzOverflow="overflow" vert="horz" wrap="square" lIns="72000" tIns="72000" rIns="72000" bIns="72000" numCol="1" spcCol="0" rtlCol="0" fromWordArt="0" anchor="t" anchorCtr="0" forceAA="0" compatLnSpc="1">
+            <a:prstTxWarp prst="textNoShape">
+              <a:avLst/>
+            </a:prstTxWarp>
+            <a:noAutofit/>
+          </a:bodyPr>
+          <a:lstStyle/>
+          <a:p>
+            <a:pPr marL="180975" indent="-180975" algn="ctr" eaLnBrk="0" fontAlgn="auto" hangingPunct="0">
+              <a:spcBef>
+                <a:spcPts val="0"/>
+              </a:spcBef>
+              <a:spcAft>
+                <a:spcPts val="0"/>
+              </a:spcAft>
+              <a:buClr>
+                <a:schemeClr val="bg1"/>
+              </a:buClr>
+              <a:buFont typeface="Arial" pitchFamily="34" charset="0"/>
+              <a:buChar char="–"/>
+            </a:pPr>
+            <a:endParaRPr lang="en-US" sz="1200" b="1" kern="0" dirty="0" err="1">
+              <a:solidFill>
+                <a:srgbClr val="FFFFFF"/>
+              </a:solidFill>
+              <a:latin typeface="Arial"/>
+            </a:endParaRPr>
+          </a:p>
+        </p:txBody>
+      </p:sp>
+      <p:sp>
+        <p:nvSpPr>
+          <p:cNvPr id="18" name="Oval 17">
+            <a:extLst>
+              <a:ext uri="{FF2B5EF4-FFF2-40B4-BE49-F238E27FC236}">
+                <a16:creationId xmlns:a16="http://schemas.microsoft.com/office/drawing/2014/main" id="{06336417-19F9-464E-93D2-B925B64AF339}"/>
+              </a:ext>
+            </a:extLst>
+          </p:cNvPr>
+          <p:cNvSpPr/>
+          <p:nvPr/>
+        </p:nvSpPr>
+        <p:spPr bwMode="auto">
+          <a:xfrm rot="20451094">
+            <a:off x="6998710" y="2858415"/>
+            <a:ext cx="1091851" cy="544818"/>
+          </a:xfrm>
+          <a:prstGeom prst="ellipse">
+            <a:avLst/>
+          </a:prstGeom>
+          <a:noFill/>
+          <a:ln w="19050">
+            <a:solidFill>
+              <a:srgbClr val="33CC33"/>
+            </a:solidFill>
+            <a:headEnd/>
+            <a:tailEnd/>
+          </a:ln>
+          <a:effectLst/>
+        </p:spPr>
+        <p:style>
+          <a:lnRef idx="1">
+            <a:schemeClr val="accent1"/>
+          </a:lnRef>
+          <a:fillRef idx="3">
+            <a:schemeClr val="accent1"/>
+          </a:fillRef>
+          <a:effectRef idx="2">
+            <a:schemeClr val="accent1"/>
+          </a:effectRef>
+          <a:fontRef idx="minor">
+            <a:schemeClr val="lt1"/>
+          </a:fontRef>
+        </p:style>
+        <p:txBody>
+          <a:bodyPr rot="0" spcFirstLastPara="0" vertOverflow="overflow" horzOverflow="overflow" vert="horz" wrap="square" lIns="72000" tIns="72000" rIns="72000" bIns="72000" numCol="1" spcCol="0" rtlCol="0" fromWordArt="0" anchor="t" anchorCtr="0" forceAA="0" compatLnSpc="1">
+            <a:prstTxWarp prst="textNoShape">
+              <a:avLst/>
+            </a:prstTxWarp>
+            <a:noAutofit/>
+          </a:bodyPr>
+          <a:lstStyle/>
+          <a:p>
+            <a:pPr marL="180975" indent="-180975" algn="ctr" eaLnBrk="0" fontAlgn="auto" hangingPunct="0">
+              <a:spcBef>
+                <a:spcPts val="0"/>
+              </a:spcBef>
+              <a:spcAft>
+                <a:spcPts val="0"/>
+              </a:spcAft>
+              <a:buClr>
+                <a:schemeClr val="bg1"/>
+              </a:buClr>
+              <a:buFont typeface="Arial" pitchFamily="34" charset="0"/>
+              <a:buChar char="–"/>
+            </a:pPr>
+            <a:endParaRPr lang="en-US" sz="1200" b="1" kern="0" dirty="0" err="1">
+              <a:solidFill>
+                <a:srgbClr val="FFFFFF"/>
+              </a:solidFill>
+              <a:latin typeface="Arial"/>
+            </a:endParaRPr>
+          </a:p>
+        </p:txBody>
+      </p:sp>
+      <p:sp>
+        <p:nvSpPr>
+          <p:cNvPr id="19" name="Oval 18">
+            <a:extLst>
+              <a:ext uri="{FF2B5EF4-FFF2-40B4-BE49-F238E27FC236}">
+                <a16:creationId xmlns:a16="http://schemas.microsoft.com/office/drawing/2014/main" id="{D0FBEE01-AA39-4D3F-8FAA-F0A2966784C7}"/>
+              </a:ext>
+            </a:extLst>
+          </p:cNvPr>
+          <p:cNvSpPr/>
+          <p:nvPr/>
+        </p:nvSpPr>
+        <p:spPr bwMode="auto">
+          <a:xfrm>
+            <a:off x="8065024" y="2547695"/>
+            <a:ext cx="917154" cy="618329"/>
+          </a:xfrm>
+          <a:prstGeom prst="ellipse">
+            <a:avLst/>
+          </a:prstGeom>
+          <a:noFill/>
+          <a:ln w="19050">
+            <a:solidFill>
+              <a:srgbClr val="33CCCC"/>
+            </a:solidFill>
+            <a:headEnd/>
+            <a:tailEnd/>
+          </a:ln>
+          <a:effectLst/>
+        </p:spPr>
+        <p:style>
+          <a:lnRef idx="1">
+            <a:schemeClr val="accent1"/>
+          </a:lnRef>
+          <a:fillRef idx="3">
+            <a:schemeClr val="accent1"/>
+          </a:fillRef>
+          <a:effectRef idx="2">
+            <a:schemeClr val="accent1"/>
+          </a:effectRef>
+          <a:fontRef idx="minor">
+            <a:schemeClr val="lt1"/>
+          </a:fontRef>
+        </p:style>
+        <p:txBody>
+          <a:bodyPr rot="0" spcFirstLastPara="0" vertOverflow="overflow" horzOverflow="overflow" vert="horz" wrap="square" lIns="72000" tIns="72000" rIns="72000" bIns="72000" numCol="1" spcCol="0" rtlCol="0" fromWordArt="0" anchor="t" anchorCtr="0" forceAA="0" compatLnSpc="1">
+            <a:prstTxWarp prst="textNoShape">
+              <a:avLst/>
+            </a:prstTxWarp>
+            <a:noAutofit/>
+          </a:bodyPr>
+          <a:lstStyle/>
+          <a:p>
+            <a:pPr marL="180975" indent="-180975" algn="ctr" eaLnBrk="0" fontAlgn="auto" hangingPunct="0">
+              <a:spcBef>
+                <a:spcPts val="0"/>
+              </a:spcBef>
+              <a:spcAft>
+                <a:spcPts val="0"/>
+              </a:spcAft>
+              <a:buClr>
+                <a:schemeClr val="bg1"/>
+              </a:buClr>
+              <a:buFont typeface="Arial" pitchFamily="34" charset="0"/>
+              <a:buChar char="–"/>
+            </a:pPr>
+            <a:endParaRPr lang="en-US" sz="1200" b="1" kern="0" dirty="0" err="1">
+              <a:solidFill>
+                <a:srgbClr val="FFC000"/>
+              </a:solidFill>
+              <a:latin typeface="Arial"/>
+            </a:endParaRPr>
+          </a:p>
+        </p:txBody>
+      </p:sp>
+      <p:sp>
+        <p:nvSpPr>
+          <p:cNvPr id="20" name="Oval 19">
+            <a:extLst>
+              <a:ext uri="{FF2B5EF4-FFF2-40B4-BE49-F238E27FC236}">
+                <a16:creationId xmlns:a16="http://schemas.microsoft.com/office/drawing/2014/main" id="{F2DE3C52-0512-4142-81F7-D1889B2342ED}"/>
+              </a:ext>
+            </a:extLst>
+          </p:cNvPr>
+          <p:cNvSpPr/>
+          <p:nvPr/>
+        </p:nvSpPr>
+        <p:spPr bwMode="auto">
+          <a:xfrm rot="16200000">
+            <a:off x="7025833" y="2932503"/>
+            <a:ext cx="587404" cy="555812"/>
+          </a:xfrm>
+          <a:prstGeom prst="ellipse">
+            <a:avLst/>
+          </a:prstGeom>
+          <a:noFill/>
+          <a:ln w="19050">
+            <a:solidFill>
+              <a:srgbClr val="FF0066"/>
+            </a:solidFill>
+            <a:headEnd/>
+            <a:tailEnd/>
+          </a:ln>
+          <a:effectLst/>
+        </p:spPr>
+        <p:style>
+          <a:lnRef idx="1">
+            <a:schemeClr val="accent1"/>
+          </a:lnRef>
+          <a:fillRef idx="3">
+            <a:schemeClr val="accent1"/>
+          </a:fillRef>
+          <a:effectRef idx="2">
+            <a:schemeClr val="accent1"/>
+          </a:effectRef>
+          <a:fontRef idx="minor">
+            <a:schemeClr val="lt1"/>
+          </a:fontRef>
+        </p:style>
+        <p:txBody>
+          <a:bodyPr rot="0" spcFirstLastPara="0" vertOverflow="overflow" horzOverflow="overflow" vert="horz" wrap="square" lIns="72000" tIns="72000" rIns="72000" bIns="72000" numCol="1" spcCol="0" rtlCol="0" fromWordArt="0" anchor="t" anchorCtr="0" forceAA="0" compatLnSpc="1">
+            <a:prstTxWarp prst="textNoShape">
+              <a:avLst/>
+            </a:prstTxWarp>
+            <a:noAutofit/>
+          </a:bodyPr>
+          <a:lstStyle/>
+          <a:p>
+            <a:pPr marL="180975" indent="-180975" algn="ctr" eaLnBrk="0" fontAlgn="auto" hangingPunct="0">
+              <a:spcBef>
+                <a:spcPts val="0"/>
+              </a:spcBef>
+              <a:spcAft>
+                <a:spcPts val="0"/>
+              </a:spcAft>
+              <a:buClr>
+                <a:schemeClr val="bg1"/>
+              </a:buClr>
+              <a:buFont typeface="Arial" pitchFamily="34" charset="0"/>
+              <a:buChar char="–"/>
+            </a:pPr>
+            <a:endParaRPr lang="en-US" sz="1200" b="1" kern="0" dirty="0" err="1">
+              <a:solidFill>
+                <a:srgbClr val="FFFFFF"/>
+              </a:solidFill>
+              <a:latin typeface="Arial"/>
+            </a:endParaRPr>
+          </a:p>
+        </p:txBody>
+      </p:sp>
+    </p:spTree>
+    <p:extLst>
+      <p:ext uri="{BB962C8B-B14F-4D97-AF65-F5344CB8AC3E}">
+        <p14:creationId xmlns:p14="http://schemas.microsoft.com/office/powerpoint/2010/main" val="3037834091"/>
       </p:ext>
     </p:extLst>
   </p:cSld>

</xml_diff>